<commit_message>
fixed contact page problem
</commit_message>
<xml_diff>
--- a/rachel_usability screenshots_pptx.pptx
+++ b/rachel_usability screenshots_pptx.pptx
@@ -873,7 +873,17 @@
           <a:p>
             <a:r>
               <a:rPr lang="en-US" dirty="0" smtClean="0"/>
-              <a:t>4. CONSISTENCY</a:t>
+              <a:t>4. </a:t>
+            </a:r>
+            <a:r>
+              <a:rPr lang="en-US" dirty="0" smtClean="0"/>
+              <a:t>CONSISTENCY</a:t>
+            </a:r>
+          </a:p>
+          <a:p>
+            <a:r>
+              <a:rPr lang="en-US" smtClean="0"/>
+              <a:t>-</a:t>
             </a:r>
             <a:endParaRPr lang="en-US" dirty="0"/>
           </a:p>
@@ -4755,7 +4765,7 @@
       </p:grpSpPr>
       <p:sp>
         <p:nvSpPr>
-          <p:cNvPr id="2" name="Rectangle 1"/>
+          <p:cNvPr id="5" name="Rectangle 4"/>
           <p:cNvSpPr/>
           <p:nvPr/>
         </p:nvSpPr>
@@ -4829,6 +4839,586 @@
           <a:chExt cx="0" cy="0"/>
         </a:xfrm>
       </p:grpSpPr>
+      <p:pic>
+        <p:nvPicPr>
+          <p:cNvPr id="2050" name="Picture 2"/>
+          <p:cNvPicPr>
+            <a:picLocks noChangeAspect="1" noChangeArrowheads="1"/>
+          </p:cNvPicPr>
+          <p:nvPr/>
+        </p:nvPicPr>
+        <p:blipFill>
+          <a:blip r:embed="rId3">
+            <a:extLst>
+              <a:ext uri="{28A0092B-C50C-407E-A947-70E740481C1C}">
+                <a14:useLocalDpi xmlns:a14="http://schemas.microsoft.com/office/drawing/2010/main" val="0"/>
+              </a:ext>
+            </a:extLst>
+          </a:blip>
+          <a:srcRect/>
+          <a:stretch>
+            <a:fillRect/>
+          </a:stretch>
+        </p:blipFill>
+        <p:spPr bwMode="auto">
+          <a:xfrm>
+            <a:off x="152399" y="170954"/>
+            <a:ext cx="6142977" cy="3715246"/>
+          </a:xfrm>
+          <a:prstGeom prst="rect">
+            <a:avLst/>
+          </a:prstGeom>
+          <a:noFill/>
+          <a:ln>
+            <a:noFill/>
+          </a:ln>
+          <a:effectLst/>
+          <a:extLst>
+            <a:ext uri="{909E8E84-426E-40DD-AFC4-6F175D3DCCD1}">
+              <a14:hiddenFill xmlns:a14="http://schemas.microsoft.com/office/drawing/2010/main">
+                <a:solidFill>
+                  <a:schemeClr val="accent1"/>
+                </a:solidFill>
+              </a14:hiddenFill>
+            </a:ext>
+            <a:ext uri="{91240B29-F687-4F45-9708-019B960494DF}">
+              <a14:hiddenLine xmlns:a14="http://schemas.microsoft.com/office/drawing/2010/main" w="9525">
+                <a:solidFill>
+                  <a:schemeClr val="tx1"/>
+                </a:solidFill>
+                <a:miter lim="800000"/>
+                <a:headEnd/>
+                <a:tailEnd/>
+              </a14:hiddenLine>
+            </a:ext>
+            <a:ext uri="{AF507438-7753-43E0-B8FC-AC1667EBCBE1}">
+              <a14:hiddenEffects xmlns:a14="http://schemas.microsoft.com/office/drawing/2010/main">
+                <a:effectLst>
+                  <a:outerShdw dist="35921" dir="2700000" algn="ctr" rotWithShape="0">
+                    <a:schemeClr val="bg2"/>
+                  </a:outerShdw>
+                </a:effectLst>
+              </a14:hiddenEffects>
+            </a:ext>
+          </a:extLst>
+        </p:spPr>
+      </p:pic>
+      <p:sp>
+        <p:nvSpPr>
+          <p:cNvPr id="4" name="Rectangle 3"/>
+          <p:cNvSpPr/>
+          <p:nvPr/>
+        </p:nvSpPr>
+        <p:spPr>
+          <a:xfrm>
+            <a:off x="755750" y="256309"/>
+            <a:ext cx="1149250" cy="277091"/>
+          </a:xfrm>
+          <a:prstGeom prst="rect">
+            <a:avLst/>
+          </a:prstGeom>
+          <a:noFill/>
+          <a:ln>
+            <a:solidFill>
+              <a:srgbClr val="0000FF"/>
+            </a:solidFill>
+          </a:ln>
+        </p:spPr>
+        <p:style>
+          <a:lnRef idx="2">
+            <a:schemeClr val="accent1">
+              <a:shade val="50000"/>
+            </a:schemeClr>
+          </a:lnRef>
+          <a:fillRef idx="1">
+            <a:schemeClr val="accent1"/>
+          </a:fillRef>
+          <a:effectRef idx="0">
+            <a:schemeClr val="accent1"/>
+          </a:effectRef>
+          <a:fontRef idx="minor">
+            <a:schemeClr val="lt1"/>
+          </a:fontRef>
+        </p:style>
+        <p:txBody>
+          <a:bodyPr rtlCol="0" anchor="ctr"/>
+          <a:lstStyle/>
+          <a:p>
+            <a:pPr algn="ctr"/>
+            <a:endParaRPr lang="en-US"/>
+          </a:p>
+        </p:txBody>
+      </p:sp>
+      <p:pic>
+        <p:nvPicPr>
+          <p:cNvPr id="2051" name="Picture 3"/>
+          <p:cNvPicPr>
+            <a:picLocks noChangeAspect="1" noChangeArrowheads="1"/>
+          </p:cNvPicPr>
+          <p:nvPr/>
+        </p:nvPicPr>
+        <p:blipFill>
+          <a:blip r:embed="rId4">
+            <a:extLst>
+              <a:ext uri="{28A0092B-C50C-407E-A947-70E740481C1C}">
+                <a14:useLocalDpi xmlns:a14="http://schemas.microsoft.com/office/drawing/2010/main" val="0"/>
+              </a:ext>
+            </a:extLst>
+          </a:blip>
+          <a:srcRect/>
+          <a:stretch>
+            <a:fillRect/>
+          </a:stretch>
+        </p:blipFill>
+        <p:spPr bwMode="auto">
+          <a:xfrm>
+            <a:off x="417462" y="1397054"/>
+            <a:ext cx="1838325" cy="571500"/>
+          </a:xfrm>
+          <a:prstGeom prst="rect">
+            <a:avLst/>
+          </a:prstGeom>
+          <a:noFill/>
+          <a:ln>
+            <a:noFill/>
+          </a:ln>
+          <a:effectLst/>
+          <a:extLst>
+            <a:ext uri="{909E8E84-426E-40DD-AFC4-6F175D3DCCD1}">
+              <a14:hiddenFill xmlns:a14="http://schemas.microsoft.com/office/drawing/2010/main">
+                <a:solidFill>
+                  <a:schemeClr val="accent1"/>
+                </a:solidFill>
+              </a14:hiddenFill>
+            </a:ext>
+            <a:ext uri="{91240B29-F687-4F45-9708-019B960494DF}">
+              <a14:hiddenLine xmlns:a14="http://schemas.microsoft.com/office/drawing/2010/main" w="9525">
+                <a:solidFill>
+                  <a:schemeClr val="tx1"/>
+                </a:solidFill>
+                <a:miter lim="800000"/>
+                <a:headEnd/>
+                <a:tailEnd/>
+              </a14:hiddenLine>
+            </a:ext>
+            <a:ext uri="{AF507438-7753-43E0-B8FC-AC1667EBCBE1}">
+              <a14:hiddenEffects xmlns:a14="http://schemas.microsoft.com/office/drawing/2010/main">
+                <a:effectLst>
+                  <a:outerShdw dist="35921" dir="2700000" algn="ctr" rotWithShape="0">
+                    <a:schemeClr val="bg2"/>
+                  </a:outerShdw>
+                </a:effectLst>
+              </a14:hiddenEffects>
+            </a:ext>
+          </a:extLst>
+        </p:spPr>
+      </p:pic>
+      <p:sp>
+        <p:nvSpPr>
+          <p:cNvPr id="6" name="Rectangle 5"/>
+          <p:cNvSpPr/>
+          <p:nvPr/>
+        </p:nvSpPr>
+        <p:spPr>
+          <a:xfrm>
+            <a:off x="326233" y="1338697"/>
+            <a:ext cx="2035967" cy="718703"/>
+          </a:xfrm>
+          <a:prstGeom prst="rect">
+            <a:avLst/>
+          </a:prstGeom>
+          <a:noFill/>
+          <a:ln>
+            <a:solidFill>
+              <a:srgbClr val="0000FF"/>
+            </a:solidFill>
+          </a:ln>
+        </p:spPr>
+        <p:style>
+          <a:lnRef idx="2">
+            <a:schemeClr val="accent1">
+              <a:shade val="50000"/>
+            </a:schemeClr>
+          </a:lnRef>
+          <a:fillRef idx="1">
+            <a:schemeClr val="accent1"/>
+          </a:fillRef>
+          <a:effectRef idx="0">
+            <a:schemeClr val="accent1"/>
+          </a:effectRef>
+          <a:fontRef idx="minor">
+            <a:schemeClr val="lt1"/>
+          </a:fontRef>
+        </p:style>
+        <p:txBody>
+          <a:bodyPr rtlCol="0" anchor="ctr"/>
+          <a:lstStyle/>
+          <a:p>
+            <a:pPr algn="ctr"/>
+            <a:endParaRPr lang="en-US"/>
+          </a:p>
+        </p:txBody>
+      </p:sp>
+      <p:cxnSp>
+        <p:nvCxnSpPr>
+          <p:cNvPr id="5" name="Straight Connector 4"/>
+          <p:cNvCxnSpPr/>
+          <p:nvPr/>
+        </p:nvCxnSpPr>
+        <p:spPr>
+          <a:xfrm flipH="1">
+            <a:off x="326234" y="533400"/>
+            <a:ext cx="1004141" cy="805297"/>
+          </a:xfrm>
+          <a:prstGeom prst="line">
+            <a:avLst/>
+          </a:prstGeom>
+          <a:ln w="28575">
+            <a:solidFill>
+              <a:srgbClr val="0000FF"/>
+            </a:solidFill>
+          </a:ln>
+        </p:spPr>
+        <p:style>
+          <a:lnRef idx="1">
+            <a:schemeClr val="accent1"/>
+          </a:lnRef>
+          <a:fillRef idx="0">
+            <a:schemeClr val="accent1"/>
+          </a:fillRef>
+          <a:effectRef idx="0">
+            <a:schemeClr val="accent1"/>
+          </a:effectRef>
+          <a:fontRef idx="minor">
+            <a:schemeClr val="tx1"/>
+          </a:fontRef>
+        </p:style>
+      </p:cxnSp>
+      <p:cxnSp>
+        <p:nvCxnSpPr>
+          <p:cNvPr id="9" name="Straight Connector 8"/>
+          <p:cNvCxnSpPr/>
+          <p:nvPr/>
+        </p:nvCxnSpPr>
+        <p:spPr>
+          <a:xfrm>
+            <a:off x="1330375" y="533400"/>
+            <a:ext cx="1025575" cy="805297"/>
+          </a:xfrm>
+          <a:prstGeom prst="line">
+            <a:avLst/>
+          </a:prstGeom>
+          <a:ln w="28575">
+            <a:solidFill>
+              <a:srgbClr val="0000FF"/>
+            </a:solidFill>
+          </a:ln>
+        </p:spPr>
+        <p:style>
+          <a:lnRef idx="1">
+            <a:schemeClr val="accent1"/>
+          </a:lnRef>
+          <a:fillRef idx="0">
+            <a:schemeClr val="accent1"/>
+          </a:fillRef>
+          <a:effectRef idx="0">
+            <a:schemeClr val="accent1"/>
+          </a:effectRef>
+          <a:fontRef idx="minor">
+            <a:schemeClr val="tx1"/>
+          </a:fontRef>
+        </p:style>
+      </p:cxnSp>
+      <p:pic>
+        <p:nvPicPr>
+          <p:cNvPr id="2052" name="Picture 4"/>
+          <p:cNvPicPr>
+            <a:picLocks noChangeAspect="1" noChangeArrowheads="1"/>
+          </p:cNvPicPr>
+          <p:nvPr/>
+        </p:nvPicPr>
+        <p:blipFill>
+          <a:blip r:embed="rId5">
+            <a:extLst>
+              <a:ext uri="{28A0092B-C50C-407E-A947-70E740481C1C}">
+                <a14:useLocalDpi xmlns:a14="http://schemas.microsoft.com/office/drawing/2010/main" val="0"/>
+              </a:ext>
+            </a:extLst>
+          </a:blip>
+          <a:srcRect/>
+          <a:stretch>
+            <a:fillRect/>
+          </a:stretch>
+        </p:blipFill>
+        <p:spPr bwMode="auto">
+          <a:xfrm>
+            <a:off x="3581400" y="1965023"/>
+            <a:ext cx="4806749" cy="3533775"/>
+          </a:xfrm>
+          <a:prstGeom prst="rect">
+            <a:avLst/>
+          </a:prstGeom>
+          <a:noFill/>
+          <a:ln>
+            <a:noFill/>
+          </a:ln>
+          <a:effectLst/>
+          <a:extLst>
+            <a:ext uri="{909E8E84-426E-40DD-AFC4-6F175D3DCCD1}">
+              <a14:hiddenFill xmlns:a14="http://schemas.microsoft.com/office/drawing/2010/main">
+                <a:solidFill>
+                  <a:schemeClr val="accent1"/>
+                </a:solidFill>
+              </a14:hiddenFill>
+            </a:ext>
+            <a:ext uri="{91240B29-F687-4F45-9708-019B960494DF}">
+              <a14:hiddenLine xmlns:a14="http://schemas.microsoft.com/office/drawing/2010/main" w="9525">
+                <a:solidFill>
+                  <a:schemeClr val="tx1"/>
+                </a:solidFill>
+                <a:miter lim="800000"/>
+                <a:headEnd/>
+                <a:tailEnd/>
+              </a14:hiddenLine>
+            </a:ext>
+            <a:ext uri="{AF507438-7753-43E0-B8FC-AC1667EBCBE1}">
+              <a14:hiddenEffects xmlns:a14="http://schemas.microsoft.com/office/drawing/2010/main">
+                <a:effectLst>
+                  <a:outerShdw dist="35921" dir="2700000" algn="ctr" rotWithShape="0">
+                    <a:schemeClr val="bg2"/>
+                  </a:outerShdw>
+                </a:effectLst>
+              </a14:hiddenEffects>
+            </a:ext>
+          </a:extLst>
+        </p:spPr>
+      </p:pic>
+      <p:sp>
+        <p:nvSpPr>
+          <p:cNvPr id="14" name="Rectangle 13"/>
+          <p:cNvSpPr/>
+          <p:nvPr/>
+        </p:nvSpPr>
+        <p:spPr>
+          <a:xfrm>
+            <a:off x="4140278" y="2057400"/>
+            <a:ext cx="1149250" cy="229001"/>
+          </a:xfrm>
+          <a:prstGeom prst="rect">
+            <a:avLst/>
+          </a:prstGeom>
+          <a:noFill/>
+          <a:ln>
+            <a:solidFill>
+              <a:srgbClr val="0000FF"/>
+            </a:solidFill>
+          </a:ln>
+        </p:spPr>
+        <p:style>
+          <a:lnRef idx="2">
+            <a:schemeClr val="accent1">
+              <a:shade val="50000"/>
+            </a:schemeClr>
+          </a:lnRef>
+          <a:fillRef idx="1">
+            <a:schemeClr val="accent1"/>
+          </a:fillRef>
+          <a:effectRef idx="0">
+            <a:schemeClr val="accent1"/>
+          </a:effectRef>
+          <a:fontRef idx="minor">
+            <a:schemeClr val="lt1"/>
+          </a:fontRef>
+        </p:style>
+        <p:txBody>
+          <a:bodyPr rtlCol="0" anchor="ctr"/>
+          <a:lstStyle/>
+          <a:p>
+            <a:pPr algn="ctr"/>
+            <a:endParaRPr lang="en-US"/>
+          </a:p>
+        </p:txBody>
+      </p:sp>
+      <p:pic>
+        <p:nvPicPr>
+          <p:cNvPr id="2053" name="Picture 5"/>
+          <p:cNvPicPr>
+            <a:picLocks noChangeAspect="1" noChangeArrowheads="1"/>
+          </p:cNvPicPr>
+          <p:nvPr/>
+        </p:nvPicPr>
+        <p:blipFill>
+          <a:blip r:embed="rId6">
+            <a:extLst>
+              <a:ext uri="{28A0092B-C50C-407E-A947-70E740481C1C}">
+                <a14:useLocalDpi xmlns:a14="http://schemas.microsoft.com/office/drawing/2010/main" val="0"/>
+              </a:ext>
+            </a:extLst>
+          </a:blip>
+          <a:srcRect/>
+          <a:stretch>
+            <a:fillRect/>
+          </a:stretch>
+        </p:blipFill>
+        <p:spPr bwMode="auto">
+          <a:xfrm>
+            <a:off x="6305942" y="1516638"/>
+            <a:ext cx="2152650" cy="438150"/>
+          </a:xfrm>
+          <a:prstGeom prst="rect">
+            <a:avLst/>
+          </a:prstGeom>
+          <a:noFill/>
+          <a:ln>
+            <a:noFill/>
+          </a:ln>
+          <a:effectLst/>
+          <a:extLst>
+            <a:ext uri="{909E8E84-426E-40DD-AFC4-6F175D3DCCD1}">
+              <a14:hiddenFill xmlns:a14="http://schemas.microsoft.com/office/drawing/2010/main">
+                <a:solidFill>
+                  <a:schemeClr val="accent1"/>
+                </a:solidFill>
+              </a14:hiddenFill>
+            </a:ext>
+            <a:ext uri="{91240B29-F687-4F45-9708-019B960494DF}">
+              <a14:hiddenLine xmlns:a14="http://schemas.microsoft.com/office/drawing/2010/main" w="9525">
+                <a:solidFill>
+                  <a:schemeClr val="tx1"/>
+                </a:solidFill>
+                <a:miter lim="800000"/>
+                <a:headEnd/>
+                <a:tailEnd/>
+              </a14:hiddenLine>
+            </a:ext>
+            <a:ext uri="{AF507438-7753-43E0-B8FC-AC1667EBCBE1}">
+              <a14:hiddenEffects xmlns:a14="http://schemas.microsoft.com/office/drawing/2010/main">
+                <a:effectLst>
+                  <a:outerShdw dist="35921" dir="2700000" algn="ctr" rotWithShape="0">
+                    <a:schemeClr val="bg2"/>
+                  </a:outerShdw>
+                </a:effectLst>
+              </a14:hiddenEffects>
+            </a:ext>
+          </a:extLst>
+        </p:spPr>
+      </p:pic>
+      <p:sp>
+        <p:nvSpPr>
+          <p:cNvPr id="16" name="Rectangle 15"/>
+          <p:cNvSpPr/>
+          <p:nvPr/>
+        </p:nvSpPr>
+        <p:spPr>
+          <a:xfrm>
+            <a:off x="6172200" y="1371600"/>
+            <a:ext cx="2463520" cy="718703"/>
+          </a:xfrm>
+          <a:prstGeom prst="rect">
+            <a:avLst/>
+          </a:prstGeom>
+          <a:noFill/>
+          <a:ln>
+            <a:solidFill>
+              <a:srgbClr val="0000FF"/>
+            </a:solidFill>
+          </a:ln>
+        </p:spPr>
+        <p:style>
+          <a:lnRef idx="2">
+            <a:schemeClr val="accent1">
+              <a:shade val="50000"/>
+            </a:schemeClr>
+          </a:lnRef>
+          <a:fillRef idx="1">
+            <a:schemeClr val="accent1"/>
+          </a:fillRef>
+          <a:effectRef idx="0">
+            <a:schemeClr val="accent1"/>
+          </a:effectRef>
+          <a:fontRef idx="minor">
+            <a:schemeClr val="lt1"/>
+          </a:fontRef>
+        </p:style>
+        <p:txBody>
+          <a:bodyPr rtlCol="0" anchor="ctr"/>
+          <a:lstStyle/>
+          <a:p>
+            <a:pPr algn="ctr"/>
+            <a:endParaRPr lang="en-US"/>
+          </a:p>
+        </p:txBody>
+      </p:sp>
+      <p:cxnSp>
+        <p:nvCxnSpPr>
+          <p:cNvPr id="19" name="Straight Connector 18"/>
+          <p:cNvCxnSpPr/>
+          <p:nvPr/>
+        </p:nvCxnSpPr>
+        <p:spPr>
+          <a:xfrm flipH="1">
+            <a:off x="5289528" y="1388051"/>
+            <a:ext cx="882672" cy="792075"/>
+          </a:xfrm>
+          <a:prstGeom prst="line">
+            <a:avLst/>
+          </a:prstGeom>
+          <a:ln w="28575">
+            <a:solidFill>
+              <a:srgbClr val="0000FF"/>
+            </a:solidFill>
+          </a:ln>
+        </p:spPr>
+        <p:style>
+          <a:lnRef idx="1">
+            <a:schemeClr val="accent1"/>
+          </a:lnRef>
+          <a:fillRef idx="0">
+            <a:schemeClr val="accent1"/>
+          </a:fillRef>
+          <a:effectRef idx="0">
+            <a:schemeClr val="accent1"/>
+          </a:effectRef>
+          <a:fontRef idx="minor">
+            <a:schemeClr val="tx1"/>
+          </a:fontRef>
+        </p:style>
+      </p:cxnSp>
+      <p:cxnSp>
+        <p:nvCxnSpPr>
+          <p:cNvPr id="32" name="Straight Connector 31"/>
+          <p:cNvCxnSpPr/>
+          <p:nvPr/>
+        </p:nvCxnSpPr>
+        <p:spPr>
+          <a:xfrm flipH="1">
+            <a:off x="5289528" y="2073851"/>
+            <a:ext cx="882672" cy="106275"/>
+          </a:xfrm>
+          <a:prstGeom prst="line">
+            <a:avLst/>
+          </a:prstGeom>
+          <a:ln w="28575">
+            <a:solidFill>
+              <a:srgbClr val="0000FF"/>
+            </a:solidFill>
+          </a:ln>
+        </p:spPr>
+        <p:style>
+          <a:lnRef idx="1">
+            <a:schemeClr val="accent1"/>
+          </a:lnRef>
+          <a:fillRef idx="0">
+            <a:schemeClr val="accent1"/>
+          </a:fillRef>
+          <a:effectRef idx="0">
+            <a:schemeClr val="accent1"/>
+          </a:effectRef>
+          <a:fontRef idx="minor">
+            <a:schemeClr val="tx1"/>
+          </a:fontRef>
+        </p:style>
+      </p:cxnSp>
     </p:spTree>
     <p:extLst>
       <p:ext uri="{BB962C8B-B14F-4D97-AF65-F5344CB8AC3E}">

</xml_diff>